<commit_message>
fix error in intro
</commit_message>
<xml_diff>
--- a/day1/Introduction.pptx
+++ b/day1/Introduction.pptx
@@ -6533,10 +6533,16 @@
               <a:rPr lang="en-US" dirty="0">
                 <a:hlinkClick r:id="rId2"/>
               </a:rPr>
-              <a:t>https://ucdavis-bioinformatics-training.github.io/2017-September-Microbial-Community-Analysis-Workshop/</a:t>
-            </a:r>
-            <a:r>
-              <a:rPr lang="en-US" dirty="0"/>
+              <a:t>https://ucdavis-bioinformatics-training.github.io</a:t>
+            </a:r>
+            <a:r>
+              <a:rPr lang="en-US">
+                <a:hlinkClick r:id="rId2"/>
+              </a:rPr>
+              <a:t>/2017_2018-single-cell-RNA-sequencing-Workshop-UCD_UCB_UCSF/</a:t>
+            </a:r>
+            <a:r>
+              <a:rPr lang="en-US"/>
               <a:t>	</a:t>
             </a:r>
           </a:p>

</xml_diff>

<commit_message>
final commit for March 2018
</commit_message>
<xml_diff>
--- a/day1/Introduction.pptx
+++ b/day1/Introduction.pptx
@@ -204,7 +204,7 @@
           <a:p>
             <a:fld id="{2BB4664A-E94C-1E48-87DE-6B2D861CC4E3}" type="datetimeFigureOut">
               <a:rPr lang="en-US" smtClean="0"/>
-              <a:t>3/19/18</a:t>
+              <a:t>3/25/18</a:t>
             </a:fld>
             <a:endParaRPr lang="en-US"/>
           </a:p>
@@ -600,7 +600,7 @@
           <a:p>
             <a:fld id="{E70F27B2-3269-4E45-84E0-3A554EA5F6EB}" type="datetimeFigureOut">
               <a:rPr lang="en-US" smtClean="0"/>
-              <a:t>3/19/18</a:t>
+              <a:t>3/25/18</a:t>
             </a:fld>
             <a:endParaRPr lang="en-US"/>
           </a:p>
@@ -768,7 +768,7 @@
           <a:p>
             <a:fld id="{E70F27B2-3269-4E45-84E0-3A554EA5F6EB}" type="datetimeFigureOut">
               <a:rPr lang="en-US" smtClean="0"/>
-              <a:t>3/19/18</a:t>
+              <a:t>3/25/18</a:t>
             </a:fld>
             <a:endParaRPr lang="en-US"/>
           </a:p>
@@ -946,7 +946,7 @@
           <a:p>
             <a:fld id="{E70F27B2-3269-4E45-84E0-3A554EA5F6EB}" type="datetimeFigureOut">
               <a:rPr lang="en-US" smtClean="0"/>
-              <a:t>3/19/18</a:t>
+              <a:t>3/25/18</a:t>
             </a:fld>
             <a:endParaRPr lang="en-US"/>
           </a:p>
@@ -1114,7 +1114,7 @@
           <a:p>
             <a:fld id="{E70F27B2-3269-4E45-84E0-3A554EA5F6EB}" type="datetimeFigureOut">
               <a:rPr lang="en-US" smtClean="0"/>
-              <a:t>3/19/18</a:t>
+              <a:t>3/25/18</a:t>
             </a:fld>
             <a:endParaRPr lang="en-US"/>
           </a:p>
@@ -1359,7 +1359,7 @@
           <a:p>
             <a:fld id="{E70F27B2-3269-4E45-84E0-3A554EA5F6EB}" type="datetimeFigureOut">
               <a:rPr lang="en-US" smtClean="0"/>
-              <a:t>3/19/18</a:t>
+              <a:t>3/25/18</a:t>
             </a:fld>
             <a:endParaRPr lang="en-US"/>
           </a:p>
@@ -1588,7 +1588,7 @@
           <a:p>
             <a:fld id="{E70F27B2-3269-4E45-84E0-3A554EA5F6EB}" type="datetimeFigureOut">
               <a:rPr lang="en-US" smtClean="0"/>
-              <a:t>3/19/18</a:t>
+              <a:t>3/25/18</a:t>
             </a:fld>
             <a:endParaRPr lang="en-US"/>
           </a:p>
@@ -1952,7 +1952,7 @@
           <a:p>
             <a:fld id="{E70F27B2-3269-4E45-84E0-3A554EA5F6EB}" type="datetimeFigureOut">
               <a:rPr lang="en-US" smtClean="0"/>
-              <a:t>3/19/18</a:t>
+              <a:t>3/25/18</a:t>
             </a:fld>
             <a:endParaRPr lang="en-US"/>
           </a:p>
@@ -2069,7 +2069,7 @@
           <a:p>
             <a:fld id="{E70F27B2-3269-4E45-84E0-3A554EA5F6EB}" type="datetimeFigureOut">
               <a:rPr lang="en-US" smtClean="0"/>
-              <a:t>3/19/18</a:t>
+              <a:t>3/25/18</a:t>
             </a:fld>
             <a:endParaRPr lang="en-US"/>
           </a:p>
@@ -2164,7 +2164,7 @@
           <a:p>
             <a:fld id="{E70F27B2-3269-4E45-84E0-3A554EA5F6EB}" type="datetimeFigureOut">
               <a:rPr lang="en-US" smtClean="0"/>
-              <a:t>3/19/18</a:t>
+              <a:t>3/25/18</a:t>
             </a:fld>
             <a:endParaRPr lang="en-US"/>
           </a:p>
@@ -2439,7 +2439,7 @@
           <a:p>
             <a:fld id="{E70F27B2-3269-4E45-84E0-3A554EA5F6EB}" type="datetimeFigureOut">
               <a:rPr lang="en-US" smtClean="0"/>
-              <a:t>3/19/18</a:t>
+              <a:t>3/25/18</a:t>
             </a:fld>
             <a:endParaRPr lang="en-US"/>
           </a:p>
@@ -2694,7 +2694,7 @@
           <a:p>
             <a:fld id="{E70F27B2-3269-4E45-84E0-3A554EA5F6EB}" type="datetimeFigureOut">
               <a:rPr lang="en-US" smtClean="0"/>
-              <a:t>3/19/18</a:t>
+              <a:t>3/25/18</a:t>
             </a:fld>
             <a:endParaRPr lang="en-US"/>
           </a:p>
@@ -2906,7 +2906,7 @@
           <a:p>
             <a:fld id="{E70F27B2-3269-4E45-84E0-3A554EA5F6EB}" type="datetimeFigureOut">
               <a:rPr lang="en-US" smtClean="0"/>
-              <a:t>3/19/18</a:t>
+              <a:t>3/25/18</a:t>
             </a:fld>
             <a:endParaRPr lang="en-US"/>
           </a:p>

</xml_diff>